<commit_message>
add trees-minimum -coloring -spanning.pptx
</commit_message>
<xml_diff>
--- a/spring13/slides13/trees-def.pptx
+++ b/spring13/slides13/trees-def.pptx
@@ -2748,13 +2748,13 @@
   <p:clrMapOvr>
     <a:masterClrMapping/>
   </p:clrMapOvr>
-  <mc:AlternateContent xmlns:mc="http://schemas.openxmlformats.org/markup-compatibility/2006">
-    <mc:Choice xmlns:p14="http://schemas.microsoft.com/office/powerpoint/2010/main" Requires="p14">
+  <mc:AlternateContent xmlns:mc="http://schemas.openxmlformats.org/markup-compatibility/2006" xmlns:p14="http://schemas.microsoft.com/office/powerpoint/2010/main">
+    <mc:Choice Requires="p14">
       <p:transition spd="slow" p14:dur="900" advClick="0">
         <p:fade/>
       </p:transition>
     </mc:Choice>
-    <mc:Fallback>
+    <mc:Fallback xmlns="">
       <p:transition xmlns:p14="http://schemas.microsoft.com/office/powerpoint/2010/main" spd="slow" advClick="0">
         <p:fade/>
       </p:transition>
@@ -2899,13 +2899,13 @@
   <p:clrMapOvr>
     <a:masterClrMapping/>
   </p:clrMapOvr>
-  <mc:AlternateContent xmlns:mc="http://schemas.openxmlformats.org/markup-compatibility/2006">
-    <mc:Choice xmlns:p14="http://schemas.microsoft.com/office/powerpoint/2010/main" Requires="p14">
+  <mc:AlternateContent xmlns:mc="http://schemas.openxmlformats.org/markup-compatibility/2006" xmlns:p14="http://schemas.microsoft.com/office/powerpoint/2010/main">
+    <mc:Choice Requires="p14">
       <p:transition spd="slow" p14:dur="900" advClick="0">
         <p:fade/>
       </p:transition>
     </mc:Choice>
-    <mc:Fallback>
+    <mc:Fallback xmlns="">
       <p:transition xmlns:p14="http://schemas.microsoft.com/office/powerpoint/2010/main" spd="slow" advClick="0">
         <p:fade/>
       </p:transition>
@@ -2998,13 +2998,13 @@
   <p:clrMapOvr>
     <a:masterClrMapping/>
   </p:clrMapOvr>
-  <mc:AlternateContent xmlns:mc="http://schemas.openxmlformats.org/markup-compatibility/2006">
-    <mc:Choice xmlns:p14="http://schemas.microsoft.com/office/powerpoint/2010/main" Requires="p14">
+  <mc:AlternateContent xmlns:mc="http://schemas.openxmlformats.org/markup-compatibility/2006" xmlns:p14="http://schemas.microsoft.com/office/powerpoint/2010/main">
+    <mc:Choice Requires="p14">
       <p:transition spd="slow" p14:dur="900" advClick="0">
         <p:fade/>
       </p:transition>
     </mc:Choice>
-    <mc:Fallback>
+    <mc:Fallback xmlns="">
       <p:transition xmlns:p14="http://schemas.microsoft.com/office/powerpoint/2010/main" spd="slow" advClick="0">
         <p:fade/>
       </p:transition>
@@ -3074,13 +3074,13 @@
   <p:clrMapOvr>
     <a:masterClrMapping/>
   </p:clrMapOvr>
-  <mc:AlternateContent xmlns:mc="http://schemas.openxmlformats.org/markup-compatibility/2006">
-    <mc:Choice xmlns:p14="http://schemas.microsoft.com/office/powerpoint/2010/main" Requires="p14">
+  <mc:AlternateContent xmlns:mc="http://schemas.openxmlformats.org/markup-compatibility/2006" xmlns:p14="http://schemas.microsoft.com/office/powerpoint/2010/main">
+    <mc:Choice Requires="p14">
       <p:transition spd="slow" p14:dur="900" advClick="0">
         <p:fade/>
       </p:transition>
     </mc:Choice>
-    <mc:Fallback>
+    <mc:Fallback xmlns="">
       <p:transition xmlns:p14="http://schemas.microsoft.com/office/powerpoint/2010/main" spd="slow" advClick="0">
         <p:fade/>
       </p:transition>
@@ -3290,13 +3290,13 @@
   <p:clrMapOvr>
     <a:masterClrMapping/>
   </p:clrMapOvr>
-  <mc:AlternateContent xmlns:mc="http://schemas.openxmlformats.org/markup-compatibility/2006">
-    <mc:Choice xmlns:p14="http://schemas.microsoft.com/office/powerpoint/2010/main" Requires="p14">
+  <mc:AlternateContent xmlns:mc="http://schemas.openxmlformats.org/markup-compatibility/2006" xmlns:p14="http://schemas.microsoft.com/office/powerpoint/2010/main">
+    <mc:Choice Requires="p14">
       <p:transition spd="slow" p14:dur="900" advClick="0">
         <p:fade/>
       </p:transition>
     </mc:Choice>
-    <mc:Fallback>
+    <mc:Fallback xmlns="">
       <p:transition xmlns:p14="http://schemas.microsoft.com/office/powerpoint/2010/main" spd="slow" advClick="0">
         <p:fade/>
       </p:transition>
@@ -3523,13 +3523,13 @@
   <p:clrMapOvr>
     <a:masterClrMapping/>
   </p:clrMapOvr>
-  <mc:AlternateContent xmlns:mc="http://schemas.openxmlformats.org/markup-compatibility/2006">
-    <mc:Choice xmlns:p14="http://schemas.microsoft.com/office/powerpoint/2010/main" Requires="p14">
+  <mc:AlternateContent xmlns:mc="http://schemas.openxmlformats.org/markup-compatibility/2006" xmlns:p14="http://schemas.microsoft.com/office/powerpoint/2010/main">
+    <mc:Choice Requires="p14">
       <p:transition spd="slow" p14:dur="900" advClick="0">
         <p:fade/>
       </p:transition>
     </mc:Choice>
-    <mc:Fallback>
+    <mc:Fallback xmlns="">
       <p:transition xmlns:p14="http://schemas.microsoft.com/office/powerpoint/2010/main" spd="slow" advClick="0">
         <p:fade/>
       </p:transition>
@@ -3808,13 +3808,7 @@
               <a:rPr lang="en-US" sz="1200" baseline="0" dirty="0" smtClean="0">
                 <a:latin typeface="Comic Sans MS" pitchFamily="66" charset="0"/>
               </a:rPr>
-              <a:t> </a:t>
-            </a:r>
-            <a:r>
-              <a:rPr lang="en-US" sz="1200" baseline="0" dirty="0" smtClean="0">
-                <a:latin typeface="Comic Sans MS" pitchFamily="66" charset="0"/>
-              </a:rPr>
-              <a:t>8,</a:t>
+              <a:t> 8,</a:t>
             </a:r>
             <a:r>
               <a:rPr lang="en-US" sz="1200" dirty="0" smtClean="0">
@@ -3871,13 +3865,13 @@
     <p:sldLayoutId id="2147483682" r:id="rId5"/>
     <p:sldLayoutId id="2147483679" r:id="rId6"/>
   </p:sldLayoutIdLst>
-  <mc:AlternateContent xmlns:mc="http://schemas.openxmlformats.org/markup-compatibility/2006">
-    <mc:Choice xmlns:p14="http://schemas.microsoft.com/office/powerpoint/2010/main" Requires="p14">
+  <mc:AlternateContent xmlns:mc="http://schemas.openxmlformats.org/markup-compatibility/2006" xmlns:p14="http://schemas.microsoft.com/office/powerpoint/2010/main">
+    <mc:Choice Requires="p14">
       <p:transition spd="slow" p14:dur="900" advClick="0">
         <p:fade/>
       </p:transition>
     </mc:Choice>
-    <mc:Fallback>
+    <mc:Fallback xmlns="">
       <p:transition xmlns:p14="http://schemas.microsoft.com/office/powerpoint/2010/main" spd="slow" advClick="0">
         <p:fade/>
       </p:transition>
@@ -4457,11 +4451,11 @@
   <p:clrMapOvr>
     <a:masterClrMapping/>
   </p:clrMapOvr>
-  <mc:AlternateContent xmlns:mc="http://schemas.openxmlformats.org/markup-compatibility/2006">
-    <mc:Choice xmlns:p14="http://schemas.microsoft.com/office/powerpoint/2010/main" Requires="p14">
+  <mc:AlternateContent xmlns:mc="http://schemas.openxmlformats.org/markup-compatibility/2006" xmlns:p14="http://schemas.microsoft.com/office/powerpoint/2010/main">
+    <mc:Choice Requires="p14">
       <p:transition p14:dur="0" advClick="0"/>
     </mc:Choice>
-    <mc:Fallback>
+    <mc:Fallback xmlns="">
       <p:transition xmlns:p14="http://schemas.microsoft.com/office/powerpoint/2010/main" advClick="0"/>
     </mc:Fallback>
   </mc:AlternateContent>
@@ -5366,13 +5360,13 @@
   <p:clrMapOvr>
     <a:masterClrMapping/>
   </p:clrMapOvr>
-  <mc:AlternateContent xmlns:mc="http://schemas.openxmlformats.org/markup-compatibility/2006">
-    <mc:Choice xmlns:p14="http://schemas.microsoft.com/office/powerpoint/2010/main" Requires="p14">
+  <mc:AlternateContent xmlns:mc="http://schemas.openxmlformats.org/markup-compatibility/2006" xmlns:p14="http://schemas.microsoft.com/office/powerpoint/2010/main">
+    <mc:Choice Requires="p14">
       <p:transition spd="slow" p14:dur="900" advClick="0">
         <p:fade/>
       </p:transition>
     </mc:Choice>
-    <mc:Fallback>
+    <mc:Fallback xmlns="">
       <p:transition xmlns:p14="http://schemas.microsoft.com/office/powerpoint/2010/main" spd="slow" advClick="0">
         <p:fade/>
       </p:transition>
@@ -6216,13 +6210,13 @@
   <p:clrMapOvr>
     <a:masterClrMapping/>
   </p:clrMapOvr>
-  <mc:AlternateContent xmlns:mc="http://schemas.openxmlformats.org/markup-compatibility/2006">
-    <mc:Choice xmlns:p14="http://schemas.microsoft.com/office/powerpoint/2010/main" Requires="p14">
+  <mc:AlternateContent xmlns:mc="http://schemas.openxmlformats.org/markup-compatibility/2006" xmlns:p14="http://schemas.microsoft.com/office/powerpoint/2010/main">
+    <mc:Choice Requires="p14">
       <p:transition spd="slow" p14:dur="900" advClick="0">
         <p:fade/>
       </p:transition>
     </mc:Choice>
-    <mc:Fallback>
+    <mc:Fallback xmlns="">
       <p:transition xmlns:p14="http://schemas.microsoft.com/office/powerpoint/2010/main" spd="slow" advClick="0">
         <p:fade/>
       </p:transition>
@@ -7003,13 +6997,13 @@
   <p:clrMapOvr>
     <a:masterClrMapping/>
   </p:clrMapOvr>
-  <mc:AlternateContent xmlns:mc="http://schemas.openxmlformats.org/markup-compatibility/2006">
-    <mc:Choice xmlns:p14="http://schemas.microsoft.com/office/powerpoint/2010/main" Requires="p14">
+  <mc:AlternateContent xmlns:mc="http://schemas.openxmlformats.org/markup-compatibility/2006" xmlns:p14="http://schemas.microsoft.com/office/powerpoint/2010/main">
+    <mc:Choice Requires="p14">
       <p:transition spd="slow" p14:dur="900" advClick="0">
         <p:fade/>
       </p:transition>
     </mc:Choice>
-    <mc:Fallback>
+    <mc:Fallback xmlns="">
       <p:transition xmlns:p14="http://schemas.microsoft.com/office/powerpoint/2010/main" spd="slow" advClick="0">
         <p:fade/>
       </p:transition>
@@ -7880,13 +7874,13 @@
   <p:clrMapOvr>
     <a:masterClrMapping/>
   </p:clrMapOvr>
-  <mc:AlternateContent xmlns:mc="http://schemas.openxmlformats.org/markup-compatibility/2006">
-    <mc:Choice xmlns:p14="http://schemas.microsoft.com/office/powerpoint/2010/main" Requires="p14">
+  <mc:AlternateContent xmlns:mc="http://schemas.openxmlformats.org/markup-compatibility/2006" xmlns:p14="http://schemas.microsoft.com/office/powerpoint/2010/main">
+    <mc:Choice Requires="p14">
       <p:transition spd="slow" p14:dur="900" advClick="0">
         <p:fade/>
       </p:transition>
     </mc:Choice>
-    <mc:Fallback>
+    <mc:Fallback xmlns="">
       <p:transition xmlns:p14="http://schemas.microsoft.com/office/powerpoint/2010/main" spd="slow" advClick="0">
         <p:fade/>
       </p:transition>
@@ -8664,13 +8658,13 @@
   <p:clrMapOvr>
     <a:masterClrMapping/>
   </p:clrMapOvr>
-  <mc:AlternateContent xmlns:mc="http://schemas.openxmlformats.org/markup-compatibility/2006">
-    <mc:Choice xmlns:p14="http://schemas.microsoft.com/office/powerpoint/2010/main" Requires="p14">
+  <mc:AlternateContent xmlns:mc="http://schemas.openxmlformats.org/markup-compatibility/2006" xmlns:p14="http://schemas.microsoft.com/office/powerpoint/2010/main">
+    <mc:Choice Requires="p14">
       <p:transition spd="slow" p14:dur="900" advClick="0">
         <p:fade/>
       </p:transition>
     </mc:Choice>
-    <mc:Fallback>
+    <mc:Fallback xmlns="">
       <p:transition xmlns:p14="http://schemas.microsoft.com/office/powerpoint/2010/main" spd="slow" advClick="0">
         <p:fade/>
       </p:transition>
@@ -8834,13 +8828,13 @@
   <p:clrMapOvr>
     <a:masterClrMapping/>
   </p:clrMapOvr>
-  <mc:AlternateContent xmlns:mc="http://schemas.openxmlformats.org/markup-compatibility/2006">
-    <mc:Choice xmlns:p14="http://schemas.microsoft.com/office/powerpoint/2010/main" Requires="p14">
+  <mc:AlternateContent xmlns:mc="http://schemas.openxmlformats.org/markup-compatibility/2006" xmlns:p14="http://schemas.microsoft.com/office/powerpoint/2010/main">
+    <mc:Choice Requires="p14">
       <p:transition spd="slow" p14:dur="900" advClick="0">
         <p:fade/>
       </p:transition>
     </mc:Choice>
-    <mc:Fallback>
+    <mc:Fallback xmlns="">
       <p:transition xmlns:p14="http://schemas.microsoft.com/office/powerpoint/2010/main" spd="slow" advClick="0">
         <p:fade/>
       </p:transition>
@@ -9120,17 +9114,8 @@
               <a:rPr lang="en-US" altLang="zh-CN" sz="4400" dirty="0" smtClean="0">
                 <a:ea typeface="宋体" pitchFamily="2" charset="-122"/>
               </a:rPr>
-              <a:t>alternative</a:t>
-            </a:r>
-            <a:r>
-              <a:rPr lang="en-US" altLang="zh-CN" sz="4400" dirty="0" smtClean="0">
-                <a:ea typeface="宋体" pitchFamily="2" charset="-122"/>
-              </a:rPr>
-              <a:t> tree definition</a:t>
-            </a:r>
-            <a:endParaRPr lang="en-US" altLang="zh-CN" sz="4400" dirty="0" smtClean="0">
-              <a:ea typeface="宋体" pitchFamily="2" charset="-122"/>
-            </a:endParaRPr>
+              <a:t>alternative tree definition</a:t>
+            </a:r>
           </a:p>
         </p:txBody>
       </p:sp>
@@ -9797,13 +9782,13 @@
   <p:clrMapOvr>
     <a:masterClrMapping/>
   </p:clrMapOvr>
-  <mc:AlternateContent xmlns:mc="http://schemas.openxmlformats.org/markup-compatibility/2006">
-    <mc:Choice xmlns:p14="http://schemas.microsoft.com/office/powerpoint/2010/main" Requires="p14">
+  <mc:AlternateContent xmlns:mc="http://schemas.openxmlformats.org/markup-compatibility/2006" xmlns:p14="http://schemas.microsoft.com/office/powerpoint/2010/main">
+    <mc:Choice Requires="p14">
       <p:transition spd="slow" p14:dur="900" advClick="0">
         <p:fade/>
       </p:transition>
     </mc:Choice>
-    <mc:Fallback>
+    <mc:Fallback xmlns="">
       <p:transition xmlns:p14="http://schemas.microsoft.com/office/powerpoint/2010/main" spd="slow" advClick="0">
         <p:fade/>
       </p:transition>
@@ -9944,9 +9929,6 @@
               </a:rPr>
               <a:t>efinitions</a:t>
             </a:r>
-            <a:endParaRPr lang="en-US" altLang="zh-CN" dirty="0" smtClean="0">
-              <a:ea typeface="宋体" pitchFamily="2" charset="-122"/>
-            </a:endParaRPr>
           </a:p>
         </p:txBody>
       </p:sp>
@@ -10947,13 +10929,13 @@
   <p:clrMapOvr>
     <a:masterClrMapping/>
   </p:clrMapOvr>
-  <mc:AlternateContent xmlns:mc="http://schemas.openxmlformats.org/markup-compatibility/2006">
-    <mc:Choice xmlns:p14="http://schemas.microsoft.com/office/powerpoint/2010/main" Requires="p14">
+  <mc:AlternateContent xmlns:mc="http://schemas.openxmlformats.org/markup-compatibility/2006" xmlns:p14="http://schemas.microsoft.com/office/powerpoint/2010/main">
+    <mc:Choice Requires="p14">
       <p:transition spd="slow" p14:dur="1100" advClick="0">
         <p:fade thruBlk="1"/>
       </p:transition>
     </mc:Choice>
-    <mc:Fallback>
+    <mc:Fallback xmlns="">
       <p:transition xmlns:p14="http://schemas.microsoft.com/office/powerpoint/2010/main" spd="slow" advClick="0">
         <p:fade thruBlk="1"/>
       </p:transition>
@@ -12296,13 +12278,13 @@
   <p:clrMapOvr>
     <a:masterClrMapping/>
   </p:clrMapOvr>
-  <mc:AlternateContent xmlns:mc="http://schemas.openxmlformats.org/markup-compatibility/2006">
-    <mc:Choice xmlns:p14="http://schemas.microsoft.com/office/powerpoint/2010/main" Requires="p14">
+  <mc:AlternateContent xmlns:mc="http://schemas.openxmlformats.org/markup-compatibility/2006" xmlns:p14="http://schemas.microsoft.com/office/powerpoint/2010/main">
+    <mc:Choice Requires="p14">
       <p:transition spd="slow" p14:dur="900" advClick="0">
         <p:fade/>
       </p:transition>
     </mc:Choice>
-    <mc:Fallback>
+    <mc:Fallback xmlns="">
       <p:transition xmlns:p14="http://schemas.microsoft.com/office/powerpoint/2010/main" spd="slow" advClick="0">
         <p:fade/>
       </p:transition>
@@ -12357,9 +12339,6 @@
               </a:rPr>
               <a:t>Come up all the time</a:t>
             </a:r>
-            <a:endParaRPr lang="en-US" altLang="zh-CN" sz="4800" dirty="0" smtClean="0">
-              <a:ea typeface="宋体" pitchFamily="2" charset="-122"/>
-            </a:endParaRPr>
           </a:p>
         </p:txBody>
       </p:sp>
@@ -12883,9 +12862,6 @@
               </a:rPr>
               <a:t>Lots of kinds</a:t>
             </a:r>
-            <a:endParaRPr lang="en-US" altLang="zh-CN" sz="4800" dirty="0" smtClean="0">
-              <a:ea typeface="宋体" pitchFamily="2" charset="-122"/>
-            </a:endParaRPr>
           </a:p>
         </p:txBody>
       </p:sp>
@@ -13029,13 +13005,13 @@
   <p:clrMapOvr>
     <a:masterClrMapping/>
   </p:clrMapOvr>
-  <mc:AlternateContent xmlns:mc="http://schemas.openxmlformats.org/markup-compatibility/2006">
-    <mc:Choice xmlns:p14="http://schemas.microsoft.com/office/powerpoint/2010/main" Requires="p14">
+  <mc:AlternateContent xmlns:mc="http://schemas.openxmlformats.org/markup-compatibility/2006" xmlns:p14="http://schemas.microsoft.com/office/powerpoint/2010/main">
+    <mc:Choice Requires="p14">
       <p:transition spd="med" p14:dur="700" advClick="0">
         <p:fade/>
       </p:transition>
     </mc:Choice>
-    <mc:Fallback>
+    <mc:Fallback xmlns="">
       <p:transition xmlns:p14="http://schemas.microsoft.com/office/powerpoint/2010/main" spd="med" advClick="0">
         <p:fade/>
       </p:transition>
@@ -14908,9 +14884,6 @@
               </a:rPr>
               <a:t>ure” trees</a:t>
             </a:r>
-            <a:endParaRPr lang="en-US" altLang="zh-CN" sz="4800" dirty="0" smtClean="0">
-              <a:ea typeface="宋体" pitchFamily="2" charset="-122"/>
-            </a:endParaRPr>
           </a:p>
         </p:txBody>
       </p:sp>
@@ -15023,13 +14996,13 @@
   <p:clrMapOvr>
     <a:masterClrMapping/>
   </p:clrMapOvr>
-  <mc:AlternateContent xmlns:mc="http://schemas.openxmlformats.org/markup-compatibility/2006">
-    <mc:Choice xmlns:p14="http://schemas.microsoft.com/office/powerpoint/2010/main" Requires="p14">
+  <mc:AlternateContent xmlns:mc="http://schemas.openxmlformats.org/markup-compatibility/2006" xmlns:p14="http://schemas.microsoft.com/office/powerpoint/2010/main">
+    <mc:Choice Requires="p14">
       <p:transition spd="med" p14:dur="700" advClick="0">
         <p:fade/>
       </p:transition>
     </mc:Choice>
-    <mc:Fallback>
+    <mc:Fallback xmlns="">
       <p:transition xmlns:p14="http://schemas.microsoft.com/office/powerpoint/2010/main" spd="med" advClick="0">
         <p:fade/>
       </p:transition>
@@ -16208,7 +16181,7 @@
                             </p:stCondLst>
                             <p:childTnLst>
                               <p:par>
-                                <p:cTn id="5" presetID="22" presetClass="entr" presetSubtype="8" fill="hold" grpId="0" nodeType="clickEffect">
+                                <p:cTn id="5" presetID="10" presetClass="entr" presetSubtype="0" fill="hold" grpId="0" nodeType="clickEffect">
                                   <p:stCondLst>
                                     <p:cond delay="0"/>
                                   </p:stCondLst>
@@ -16216,6 +16189,112 @@
                                     <p:set>
                                       <p:cBhvr>
                                         <p:cTn id="6" dur="1" fill="hold">
+                                          <p:stCondLst>
+                                            <p:cond delay="0"/>
+                                          </p:stCondLst>
+                                        </p:cTn>
+                                        <p:tgtEl>
+                                          <p:spTgt spid="58371"/>
+                                        </p:tgtEl>
+                                        <p:attrNameLst>
+                                          <p:attrName>style.visibility</p:attrName>
+                                        </p:attrNameLst>
+                                      </p:cBhvr>
+                                      <p:to>
+                                        <p:strVal val="visible"/>
+                                      </p:to>
+                                    </p:set>
+                                    <p:animEffect transition="in" filter="fade">
+                                      <p:cBhvr>
+                                        <p:cTn id="7" dur="500"/>
+                                        <p:tgtEl>
+                                          <p:spTgt spid="58371"/>
+                                        </p:tgtEl>
+                                      </p:cBhvr>
+                                    </p:animEffect>
+                                  </p:childTnLst>
+                                </p:cTn>
+                              </p:par>
+                            </p:childTnLst>
+                          </p:cTn>
+                        </p:par>
+                      </p:childTnLst>
+                    </p:cTn>
+                  </p:par>
+                  <p:par>
+                    <p:cTn id="8" fill="hold">
+                      <p:stCondLst>
+                        <p:cond delay="indefinite"/>
+                      </p:stCondLst>
+                      <p:childTnLst>
+                        <p:par>
+                          <p:cTn id="9" fill="hold">
+                            <p:stCondLst>
+                              <p:cond delay="0"/>
+                            </p:stCondLst>
+                            <p:childTnLst>
+                              <p:par>
+                                <p:cTn id="10" presetID="10" presetClass="entr" presetSubtype="0" fill="hold" nodeType="clickEffect">
+                                  <p:stCondLst>
+                                    <p:cond delay="0"/>
+                                  </p:stCondLst>
+                                  <p:childTnLst>
+                                    <p:set>
+                                      <p:cBhvr>
+                                        <p:cTn id="11" dur="1" fill="hold">
+                                          <p:stCondLst>
+                                            <p:cond delay="0"/>
+                                          </p:stCondLst>
+                                        </p:cTn>
+                                        <p:tgtEl>
+                                          <p:spTgt spid="20"/>
+                                        </p:tgtEl>
+                                        <p:attrNameLst>
+                                          <p:attrName>style.visibility</p:attrName>
+                                        </p:attrNameLst>
+                                      </p:cBhvr>
+                                      <p:to>
+                                        <p:strVal val="visible"/>
+                                      </p:to>
+                                    </p:set>
+                                    <p:animEffect transition="in" filter="fade">
+                                      <p:cBhvr>
+                                        <p:cTn id="12" dur="500"/>
+                                        <p:tgtEl>
+                                          <p:spTgt spid="20"/>
+                                        </p:tgtEl>
+                                      </p:cBhvr>
+                                    </p:animEffect>
+                                  </p:childTnLst>
+                                </p:cTn>
+                              </p:par>
+                            </p:childTnLst>
+                          </p:cTn>
+                        </p:par>
+                      </p:childTnLst>
+                    </p:cTn>
+                  </p:par>
+                  <p:par>
+                    <p:cTn id="13" fill="hold">
+                      <p:stCondLst>
+                        <p:cond delay="indefinite"/>
+                      </p:stCondLst>
+                      <p:childTnLst>
+                        <p:par>
+                          <p:cTn id="14" fill="hold">
+                            <p:stCondLst>
+                              <p:cond delay="0"/>
+                            </p:stCondLst>
+                            <p:childTnLst>
+                              <p:par>
+                                <p:cTn id="15" presetID="22" presetClass="entr" presetSubtype="8" fill="hold" grpId="0" nodeType="clickEffect">
+                                  <p:stCondLst>
+                                    <p:cond delay="0"/>
+                                  </p:stCondLst>
+                                  <p:childTnLst>
+                                    <p:set>
+                                      <p:cBhvr>
+                                        <p:cTn id="16" dur="1" fill="hold">
                                           <p:stCondLst>
                                             <p:cond delay="0"/>
                                           </p:stCondLst>
@@ -16233,7 +16312,7 @@
                                     </p:set>
                                     <p:animEffect transition="in" filter="wipe(left)">
                                       <p:cBhvr>
-                                        <p:cTn id="7" dur="500"/>
+                                        <p:cTn id="17" dur="500"/>
                                         <p:tgtEl>
                                           <p:spTgt spid="58378"/>
                                         </p:tgtEl>
@@ -16246,20 +16325,20 @@
                           </p:cTn>
                         </p:par>
                         <p:par>
-                          <p:cTn id="8" fill="hold">
+                          <p:cTn id="18" fill="hold">
                             <p:stCondLst>
                               <p:cond delay="500"/>
                             </p:stCondLst>
                             <p:childTnLst>
                               <p:par>
-                                <p:cTn id="9" presetID="22" presetClass="entr" presetSubtype="2" fill="hold" grpId="0" nodeType="afterEffect">
+                                <p:cTn id="19" presetID="22" presetClass="entr" presetSubtype="2" fill="hold" grpId="0" nodeType="afterEffect">
                                   <p:stCondLst>
                                     <p:cond delay="0"/>
                                   </p:stCondLst>
                                   <p:childTnLst>
                                     <p:set>
                                       <p:cBhvr>
-                                        <p:cTn id="10" dur="1" fill="hold">
+                                        <p:cTn id="20" dur="1" fill="hold">
                                           <p:stCondLst>
                                             <p:cond delay="0"/>
                                           </p:stCondLst>
@@ -16277,7 +16356,7 @@
                                     </p:set>
                                     <p:animEffect transition="in" filter="wipe(right)">
                                       <p:cBhvr>
-                                        <p:cTn id="11" dur="500"/>
+                                        <p:cTn id="21" dur="500"/>
                                         <p:tgtEl>
                                           <p:spTgt spid="15"/>
                                         </p:tgtEl>
@@ -16314,6 +16393,7 @@
       </p:par>
     </p:tnLst>
     <p:bldLst>
+      <p:bldP spid="58371" grpId="0"/>
       <p:bldP spid="58378" grpId="0" animBg="1"/>
       <p:bldP spid="15" grpId="0" animBg="1"/>
     </p:bldLst>
@@ -16950,13 +17030,13 @@
   <p:clrMapOvr>
     <a:masterClrMapping/>
   </p:clrMapOvr>
-  <mc:AlternateContent xmlns:mc="http://schemas.openxmlformats.org/markup-compatibility/2006">
-    <mc:Choice xmlns:p14="http://schemas.microsoft.com/office/powerpoint/2010/main" Requires="p14">
+  <mc:AlternateContent xmlns:mc="http://schemas.openxmlformats.org/markup-compatibility/2006" xmlns:p14="http://schemas.microsoft.com/office/powerpoint/2010/main">
+    <mc:Choice Requires="p14">
       <p:transition spd="slow" p14:dur="900" advClick="0">
         <p:fade/>
       </p:transition>
     </mc:Choice>
-    <mc:Fallback>
+    <mc:Fallback xmlns="">
       <p:transition xmlns:p14="http://schemas.microsoft.com/office/powerpoint/2010/main" spd="slow" advClick="0">
         <p:fade/>
       </p:transition>

</xml_diff>